<commit_message>
Audit 2 presentation (Draft + Timeline)
</commit_message>
<xml_diff>
--- a/Documentation/Audit_1/Powerpoint/CourseAI Schedule with Milestones.pptx
+++ b/Documentation/Audit_1/Powerpoint/CourseAI Schedule with Milestones.pptx
@@ -4,6 +4,9 @@
   <p:sldMasterIdLst>
     <p:sldMasterId id="2147483648" r:id="rId1"/>
   </p:sldMasterIdLst>
+  <p:notesMasterIdLst>
+    <p:notesMasterId r:id="rId3"/>
+  </p:notesMasterIdLst>
   <p:sldIdLst>
     <p:sldId id="256" r:id="rId2"/>
   </p:sldIdLst>
@@ -112,6 +115,355 @@
 </p:presentation>
 </file>
 
+<file path=ppt/notesMasters/notesMaster1.xml><?xml version="1.0" encoding="utf-8"?>
+<p:notesMaster xmlns:a="http://schemas.openxmlformats.org/drawingml/2006/main" xmlns:r="http://schemas.openxmlformats.org/officeDocument/2006/relationships" xmlns:p="http://schemas.openxmlformats.org/presentationml/2006/main">
+  <p:cSld>
+    <p:bg>
+      <p:bgRef idx="1001">
+        <a:schemeClr val="bg1"/>
+      </p:bgRef>
+    </p:bg>
+    <p:spTree>
+      <p:nvGrpSpPr>
+        <p:cNvPr id="1" name=""/>
+        <p:cNvGrpSpPr/>
+        <p:nvPr/>
+      </p:nvGrpSpPr>
+      <p:grpSpPr>
+        <a:xfrm>
+          <a:off x="0" y="0"/>
+          <a:ext cx="0" cy="0"/>
+          <a:chOff x="0" y="0"/>
+          <a:chExt cx="0" cy="0"/>
+        </a:xfrm>
+      </p:grpSpPr>
+      <p:sp>
+        <p:nvSpPr>
+          <p:cNvPr id="2" name="Header Placeholder 1"/>
+          <p:cNvSpPr>
+            <a:spLocks noGrp="1"/>
+          </p:cNvSpPr>
+          <p:nvPr>
+            <p:ph type="hdr" sz="quarter"/>
+          </p:nvPr>
+        </p:nvSpPr>
+        <p:spPr>
+          <a:xfrm>
+            <a:off x="0" y="0"/>
+            <a:ext cx="2971800" cy="458788"/>
+          </a:xfrm>
+          <a:prstGeom prst="rect">
+            <a:avLst/>
+          </a:prstGeom>
+        </p:spPr>
+        <p:txBody>
+          <a:bodyPr vert="horz" lIns="91440" tIns="45720" rIns="91440" bIns="45720" rtlCol="0"/>
+          <a:lstStyle>
+            <a:lvl1pPr algn="l">
+              <a:defRPr sz="1200"/>
+            </a:lvl1pPr>
+          </a:lstStyle>
+          <a:p>
+            <a:endParaRPr lang="en-US"/>
+          </a:p>
+        </p:txBody>
+      </p:sp>
+      <p:sp>
+        <p:nvSpPr>
+          <p:cNvPr id="3" name="Date Placeholder 2"/>
+          <p:cNvSpPr>
+            <a:spLocks noGrp="1"/>
+          </p:cNvSpPr>
+          <p:nvPr>
+            <p:ph type="dt" idx="1"/>
+          </p:nvPr>
+        </p:nvSpPr>
+        <p:spPr>
+          <a:xfrm>
+            <a:off x="3884613" y="0"/>
+            <a:ext cx="2971800" cy="458788"/>
+          </a:xfrm>
+          <a:prstGeom prst="rect">
+            <a:avLst/>
+          </a:prstGeom>
+        </p:spPr>
+        <p:txBody>
+          <a:bodyPr vert="horz" lIns="91440" tIns="45720" rIns="91440" bIns="45720" rtlCol="0"/>
+          <a:lstStyle>
+            <a:lvl1pPr algn="r">
+              <a:defRPr sz="1200"/>
+            </a:lvl1pPr>
+          </a:lstStyle>
+          <a:p>
+            <a:fld id="{F8FD6BB3-2BF4-D84D-8AEB-E956CAC839FE}" type="datetimeFigureOut">
+              <a:rPr lang="en-US" smtClean="0"/>
+              <a:t>3/5/2018</a:t>
+            </a:fld>
+            <a:endParaRPr lang="en-US"/>
+          </a:p>
+        </p:txBody>
+      </p:sp>
+      <p:sp>
+        <p:nvSpPr>
+          <p:cNvPr id="4" name="Slide Image Placeholder 3"/>
+          <p:cNvSpPr>
+            <a:spLocks noGrp="1" noRot="1" noChangeAspect="1"/>
+          </p:cNvSpPr>
+          <p:nvPr>
+            <p:ph type="sldImg" idx="2"/>
+          </p:nvPr>
+        </p:nvSpPr>
+        <p:spPr>
+          <a:xfrm>
+            <a:off x="685800" y="1143000"/>
+            <a:ext cx="5486400" cy="3086100"/>
+          </a:xfrm>
+          <a:prstGeom prst="rect">
+            <a:avLst/>
+          </a:prstGeom>
+          <a:noFill/>
+          <a:ln w="12700">
+            <a:solidFill>
+              <a:prstClr val="black"/>
+            </a:solidFill>
+          </a:ln>
+        </p:spPr>
+        <p:txBody>
+          <a:bodyPr vert="horz" lIns="91440" tIns="45720" rIns="91440" bIns="45720" rtlCol="0" anchor="ctr"/>
+          <a:lstStyle/>
+          <a:p>
+            <a:endParaRPr lang="en-US"/>
+          </a:p>
+        </p:txBody>
+      </p:sp>
+      <p:sp>
+        <p:nvSpPr>
+          <p:cNvPr id="5" name="Notes Placeholder 4"/>
+          <p:cNvSpPr>
+            <a:spLocks noGrp="1"/>
+          </p:cNvSpPr>
+          <p:nvPr>
+            <p:ph type="body" sz="quarter" idx="3"/>
+          </p:nvPr>
+        </p:nvSpPr>
+        <p:spPr>
+          <a:xfrm>
+            <a:off x="685800" y="4400550"/>
+            <a:ext cx="5486400" cy="3600450"/>
+          </a:xfrm>
+          <a:prstGeom prst="rect">
+            <a:avLst/>
+          </a:prstGeom>
+        </p:spPr>
+        <p:txBody>
+          <a:bodyPr vert="horz" lIns="91440" tIns="45720" rIns="91440" bIns="45720" rtlCol="0"/>
+          <a:lstStyle/>
+          <a:p>
+            <a:pPr lvl="0"/>
+            <a:r>
+              <a:rPr lang="en-US"/>
+              <a:t>Click to edit Master text styles</a:t>
+            </a:r>
+          </a:p>
+          <a:p>
+            <a:pPr lvl="1"/>
+            <a:r>
+              <a:rPr lang="en-US"/>
+              <a:t>Second level</a:t>
+            </a:r>
+          </a:p>
+          <a:p>
+            <a:pPr lvl="2"/>
+            <a:r>
+              <a:rPr lang="en-US"/>
+              <a:t>Third level</a:t>
+            </a:r>
+          </a:p>
+          <a:p>
+            <a:pPr lvl="3"/>
+            <a:r>
+              <a:rPr lang="en-US"/>
+              <a:t>Fourth level</a:t>
+            </a:r>
+          </a:p>
+          <a:p>
+            <a:pPr lvl="4"/>
+            <a:r>
+              <a:rPr lang="en-US"/>
+              <a:t>Fifth level</a:t>
+            </a:r>
+          </a:p>
+        </p:txBody>
+      </p:sp>
+      <p:sp>
+        <p:nvSpPr>
+          <p:cNvPr id="6" name="Footer Placeholder 5"/>
+          <p:cNvSpPr>
+            <a:spLocks noGrp="1"/>
+          </p:cNvSpPr>
+          <p:nvPr>
+            <p:ph type="ftr" sz="quarter" idx="4"/>
+          </p:nvPr>
+        </p:nvSpPr>
+        <p:spPr>
+          <a:xfrm>
+            <a:off x="0" y="8685213"/>
+            <a:ext cx="2971800" cy="458787"/>
+          </a:xfrm>
+          <a:prstGeom prst="rect">
+            <a:avLst/>
+          </a:prstGeom>
+        </p:spPr>
+        <p:txBody>
+          <a:bodyPr vert="horz" lIns="91440" tIns="45720" rIns="91440" bIns="45720" rtlCol="0" anchor="b"/>
+          <a:lstStyle>
+            <a:lvl1pPr algn="l">
+              <a:defRPr sz="1200"/>
+            </a:lvl1pPr>
+          </a:lstStyle>
+          <a:p>
+            <a:endParaRPr lang="en-US"/>
+          </a:p>
+        </p:txBody>
+      </p:sp>
+      <p:sp>
+        <p:nvSpPr>
+          <p:cNvPr id="7" name="Slide Number Placeholder 6"/>
+          <p:cNvSpPr>
+            <a:spLocks noGrp="1"/>
+          </p:cNvSpPr>
+          <p:nvPr>
+            <p:ph type="sldNum" sz="quarter" idx="5"/>
+          </p:nvPr>
+        </p:nvSpPr>
+        <p:spPr>
+          <a:xfrm>
+            <a:off x="3884613" y="8685213"/>
+            <a:ext cx="2971800" cy="458787"/>
+          </a:xfrm>
+          <a:prstGeom prst="rect">
+            <a:avLst/>
+          </a:prstGeom>
+        </p:spPr>
+        <p:txBody>
+          <a:bodyPr vert="horz" lIns="91440" tIns="45720" rIns="91440" bIns="45720" rtlCol="0" anchor="b"/>
+          <a:lstStyle>
+            <a:lvl1pPr algn="r">
+              <a:defRPr sz="1200"/>
+            </a:lvl1pPr>
+          </a:lstStyle>
+          <a:p>
+            <a:fld id="{B1A7F1DA-D3DA-FE4C-B219-53FE02BBB4C7}" type="slidenum">
+              <a:rPr lang="en-US" smtClean="0"/>
+              <a:t>‹#›</a:t>
+            </a:fld>
+            <a:endParaRPr lang="en-US"/>
+          </a:p>
+        </p:txBody>
+      </p:sp>
+    </p:spTree>
+    <p:extLst>
+      <p:ext uri="{BB962C8B-B14F-4D97-AF65-F5344CB8AC3E}">
+        <p14:creationId xmlns:p14="http://schemas.microsoft.com/office/powerpoint/2010/main" val="1938536724"/>
+      </p:ext>
+    </p:extLst>
+  </p:cSld>
+  <p:clrMap bg1="lt1" tx1="dk1" bg2="lt2" tx2="dk2" accent1="accent1" accent2="accent2" accent3="accent3" accent4="accent4" accent5="accent5" accent6="accent6" hlink="hlink" folHlink="folHlink"/>
+  <p:notesStyle>
+    <a:lvl1pPr marL="0" algn="l" defTabSz="914400" rtl="0" eaLnBrk="1" latinLnBrk="0" hangingPunct="1">
+      <a:defRPr sz="1200" kern="1200">
+        <a:solidFill>
+          <a:schemeClr val="tx1"/>
+        </a:solidFill>
+        <a:latin typeface="+mn-lt"/>
+        <a:ea typeface="+mn-ea"/>
+        <a:cs typeface="+mn-cs"/>
+      </a:defRPr>
+    </a:lvl1pPr>
+    <a:lvl2pPr marL="457200" algn="l" defTabSz="914400" rtl="0" eaLnBrk="1" latinLnBrk="0" hangingPunct="1">
+      <a:defRPr sz="1200" kern="1200">
+        <a:solidFill>
+          <a:schemeClr val="tx1"/>
+        </a:solidFill>
+        <a:latin typeface="+mn-lt"/>
+        <a:ea typeface="+mn-ea"/>
+        <a:cs typeface="+mn-cs"/>
+      </a:defRPr>
+    </a:lvl2pPr>
+    <a:lvl3pPr marL="914400" algn="l" defTabSz="914400" rtl="0" eaLnBrk="1" latinLnBrk="0" hangingPunct="1">
+      <a:defRPr sz="1200" kern="1200">
+        <a:solidFill>
+          <a:schemeClr val="tx1"/>
+        </a:solidFill>
+        <a:latin typeface="+mn-lt"/>
+        <a:ea typeface="+mn-ea"/>
+        <a:cs typeface="+mn-cs"/>
+      </a:defRPr>
+    </a:lvl3pPr>
+    <a:lvl4pPr marL="1371600" algn="l" defTabSz="914400" rtl="0" eaLnBrk="1" latinLnBrk="0" hangingPunct="1">
+      <a:defRPr sz="1200" kern="1200">
+        <a:solidFill>
+          <a:schemeClr val="tx1"/>
+        </a:solidFill>
+        <a:latin typeface="+mn-lt"/>
+        <a:ea typeface="+mn-ea"/>
+        <a:cs typeface="+mn-cs"/>
+      </a:defRPr>
+    </a:lvl4pPr>
+    <a:lvl5pPr marL="1828800" algn="l" defTabSz="914400" rtl="0" eaLnBrk="1" latinLnBrk="0" hangingPunct="1">
+      <a:defRPr sz="1200" kern="1200">
+        <a:solidFill>
+          <a:schemeClr val="tx1"/>
+        </a:solidFill>
+        <a:latin typeface="+mn-lt"/>
+        <a:ea typeface="+mn-ea"/>
+        <a:cs typeface="+mn-cs"/>
+      </a:defRPr>
+    </a:lvl5pPr>
+    <a:lvl6pPr marL="2286000" algn="l" defTabSz="914400" rtl="0" eaLnBrk="1" latinLnBrk="0" hangingPunct="1">
+      <a:defRPr sz="1200" kern="1200">
+        <a:solidFill>
+          <a:schemeClr val="tx1"/>
+        </a:solidFill>
+        <a:latin typeface="+mn-lt"/>
+        <a:ea typeface="+mn-ea"/>
+        <a:cs typeface="+mn-cs"/>
+      </a:defRPr>
+    </a:lvl6pPr>
+    <a:lvl7pPr marL="2743200" algn="l" defTabSz="914400" rtl="0" eaLnBrk="1" latinLnBrk="0" hangingPunct="1">
+      <a:defRPr sz="1200" kern="1200">
+        <a:solidFill>
+          <a:schemeClr val="tx1"/>
+        </a:solidFill>
+        <a:latin typeface="+mn-lt"/>
+        <a:ea typeface="+mn-ea"/>
+        <a:cs typeface="+mn-cs"/>
+      </a:defRPr>
+    </a:lvl7pPr>
+    <a:lvl8pPr marL="3200400" algn="l" defTabSz="914400" rtl="0" eaLnBrk="1" latinLnBrk="0" hangingPunct="1">
+      <a:defRPr sz="1200" kern="1200">
+        <a:solidFill>
+          <a:schemeClr val="tx1"/>
+        </a:solidFill>
+        <a:latin typeface="+mn-lt"/>
+        <a:ea typeface="+mn-ea"/>
+        <a:cs typeface="+mn-cs"/>
+      </a:defRPr>
+    </a:lvl8pPr>
+    <a:lvl9pPr marL="3657600" algn="l" defTabSz="914400" rtl="0" eaLnBrk="1" latinLnBrk="0" hangingPunct="1">
+      <a:defRPr sz="1200" kern="1200">
+        <a:solidFill>
+          <a:schemeClr val="tx1"/>
+        </a:solidFill>
+        <a:latin typeface="+mn-lt"/>
+        <a:ea typeface="+mn-ea"/>
+        <a:cs typeface="+mn-cs"/>
+      </a:defRPr>
+    </a:lvl9pPr>
+  </p:notesStyle>
+</p:notesMaster>
+</file>
+
 <file path=ppt/slideLayouts/slideLayout1.xml><?xml version="1.0" encoding="utf-8"?>
 <p:sldLayout xmlns:a="http://schemas.openxmlformats.org/drawingml/2006/main" xmlns:r="http://schemas.openxmlformats.org/officeDocument/2006/relationships" xmlns:p="http://schemas.openxmlformats.org/presentationml/2006/main" type="title" preserve="1">
   <p:cSld name="Title Slide">
@@ -154,7 +506,7 @@
           </a:lstStyle>
           <a:p>
             <a:r>
-              <a:rPr lang="en-US" smtClean="0"/>
+              <a:rPr lang="en-US"/>
               <a:t>Click to edit Master title style</a:t>
             </a:r>
             <a:endParaRPr lang="en-AU"/>
@@ -219,7 +571,7 @@
           </a:lstStyle>
           <a:p>
             <a:r>
-              <a:rPr lang="en-US" smtClean="0"/>
+              <a:rPr lang="en-US"/>
               <a:t>Click to edit Master subtitle style</a:t>
             </a:r>
             <a:endParaRPr lang="en-AU"/>
@@ -243,7 +595,7 @@
           <a:p>
             <a:fld id="{7E430E1D-FE5C-4BDB-89B6-57F9556F3DCF}" type="datetimeFigureOut">
               <a:rPr lang="en-AU" smtClean="0"/>
-              <a:t>4/03/2018</a:t>
+              <a:t>5/03/2018</a:t>
             </a:fld>
             <a:endParaRPr lang="en-AU"/>
           </a:p>
@@ -337,7 +689,7 @@
           <a:lstStyle/>
           <a:p>
             <a:r>
-              <a:rPr lang="en-US" smtClean="0"/>
+              <a:rPr lang="en-US"/>
               <a:t>Click to edit Master title style</a:t>
             </a:r>
             <a:endParaRPr lang="en-AU"/>
@@ -361,35 +713,35 @@
           <a:p>
             <a:pPr lvl="0"/>
             <a:r>
-              <a:rPr lang="en-US" smtClean="0"/>
+              <a:rPr lang="en-US"/>
               <a:t>Click to edit Master text styles</a:t>
             </a:r>
           </a:p>
           <a:p>
             <a:pPr lvl="1"/>
             <a:r>
-              <a:rPr lang="en-US" smtClean="0"/>
+              <a:rPr lang="en-US"/>
               <a:t>Second level</a:t>
             </a:r>
           </a:p>
           <a:p>
             <a:pPr lvl="2"/>
             <a:r>
-              <a:rPr lang="en-US" smtClean="0"/>
+              <a:rPr lang="en-US"/>
               <a:t>Third level</a:t>
             </a:r>
           </a:p>
           <a:p>
             <a:pPr lvl="3"/>
             <a:r>
-              <a:rPr lang="en-US" smtClean="0"/>
+              <a:rPr lang="en-US"/>
               <a:t>Fourth level</a:t>
             </a:r>
           </a:p>
           <a:p>
             <a:pPr lvl="4"/>
             <a:r>
-              <a:rPr lang="en-US" smtClean="0"/>
+              <a:rPr lang="en-US"/>
               <a:t>Fifth level</a:t>
             </a:r>
             <a:endParaRPr lang="en-AU"/>
@@ -413,7 +765,7 @@
           <a:p>
             <a:fld id="{7E430E1D-FE5C-4BDB-89B6-57F9556F3DCF}" type="datetimeFigureOut">
               <a:rPr lang="en-AU" smtClean="0"/>
-              <a:t>4/03/2018</a:t>
+              <a:t>5/03/2018</a:t>
             </a:fld>
             <a:endParaRPr lang="en-AU"/>
           </a:p>
@@ -512,7 +864,7 @@
           <a:lstStyle/>
           <a:p>
             <a:r>
-              <a:rPr lang="en-US" smtClean="0"/>
+              <a:rPr lang="en-US"/>
               <a:t>Click to edit Master title style</a:t>
             </a:r>
             <a:endParaRPr lang="en-AU"/>
@@ -541,35 +893,35 @@
           <a:p>
             <a:pPr lvl="0"/>
             <a:r>
-              <a:rPr lang="en-US" smtClean="0"/>
+              <a:rPr lang="en-US"/>
               <a:t>Click to edit Master text styles</a:t>
             </a:r>
           </a:p>
           <a:p>
             <a:pPr lvl="1"/>
             <a:r>
-              <a:rPr lang="en-US" smtClean="0"/>
+              <a:rPr lang="en-US"/>
               <a:t>Second level</a:t>
             </a:r>
           </a:p>
           <a:p>
             <a:pPr lvl="2"/>
             <a:r>
-              <a:rPr lang="en-US" smtClean="0"/>
+              <a:rPr lang="en-US"/>
               <a:t>Third level</a:t>
             </a:r>
           </a:p>
           <a:p>
             <a:pPr lvl="3"/>
             <a:r>
-              <a:rPr lang="en-US" smtClean="0"/>
+              <a:rPr lang="en-US"/>
               <a:t>Fourth level</a:t>
             </a:r>
           </a:p>
           <a:p>
             <a:pPr lvl="4"/>
             <a:r>
-              <a:rPr lang="en-US" smtClean="0"/>
+              <a:rPr lang="en-US"/>
               <a:t>Fifth level</a:t>
             </a:r>
             <a:endParaRPr lang="en-AU"/>
@@ -593,7 +945,7 @@
           <a:p>
             <a:fld id="{7E430E1D-FE5C-4BDB-89B6-57F9556F3DCF}" type="datetimeFigureOut">
               <a:rPr lang="en-AU" smtClean="0"/>
-              <a:t>4/03/2018</a:t>
+              <a:t>5/03/2018</a:t>
             </a:fld>
             <a:endParaRPr lang="en-AU"/>
           </a:p>
@@ -687,7 +1039,7 @@
           <a:lstStyle/>
           <a:p>
             <a:r>
-              <a:rPr lang="en-US" smtClean="0"/>
+              <a:rPr lang="en-US"/>
               <a:t>Click to edit Master title style</a:t>
             </a:r>
             <a:endParaRPr lang="en-AU"/>
@@ -711,35 +1063,35 @@
           <a:p>
             <a:pPr lvl="0"/>
             <a:r>
-              <a:rPr lang="en-US" smtClean="0"/>
+              <a:rPr lang="en-US"/>
               <a:t>Click to edit Master text styles</a:t>
             </a:r>
           </a:p>
           <a:p>
             <a:pPr lvl="1"/>
             <a:r>
-              <a:rPr lang="en-US" smtClean="0"/>
+              <a:rPr lang="en-US"/>
               <a:t>Second level</a:t>
             </a:r>
           </a:p>
           <a:p>
             <a:pPr lvl="2"/>
             <a:r>
-              <a:rPr lang="en-US" smtClean="0"/>
+              <a:rPr lang="en-US"/>
               <a:t>Third level</a:t>
             </a:r>
           </a:p>
           <a:p>
             <a:pPr lvl="3"/>
             <a:r>
-              <a:rPr lang="en-US" smtClean="0"/>
+              <a:rPr lang="en-US"/>
               <a:t>Fourth level</a:t>
             </a:r>
           </a:p>
           <a:p>
             <a:pPr lvl="4"/>
             <a:r>
-              <a:rPr lang="en-US" smtClean="0"/>
+              <a:rPr lang="en-US"/>
               <a:t>Fifth level</a:t>
             </a:r>
             <a:endParaRPr lang="en-AU"/>
@@ -763,7 +1115,7 @@
           <a:p>
             <a:fld id="{7E430E1D-FE5C-4BDB-89B6-57F9556F3DCF}" type="datetimeFigureOut">
               <a:rPr lang="en-AU" smtClean="0"/>
-              <a:t>4/03/2018</a:t>
+              <a:t>5/03/2018</a:t>
             </a:fld>
             <a:endParaRPr lang="en-AU"/>
           </a:p>
@@ -866,7 +1218,7 @@
           </a:lstStyle>
           <a:p>
             <a:r>
-              <a:rPr lang="en-US" smtClean="0"/>
+              <a:rPr lang="en-US"/>
               <a:t>Click to edit Master title style</a:t>
             </a:r>
             <a:endParaRPr lang="en-AU"/>
@@ -986,7 +1338,7 @@
           <a:p>
             <a:pPr lvl="0"/>
             <a:r>
-              <a:rPr lang="en-US" smtClean="0"/>
+              <a:rPr lang="en-US"/>
               <a:t>Click to edit Master text styles</a:t>
             </a:r>
           </a:p>
@@ -1009,7 +1361,7 @@
           <a:p>
             <a:fld id="{7E430E1D-FE5C-4BDB-89B6-57F9556F3DCF}" type="datetimeFigureOut">
               <a:rPr lang="en-AU" smtClean="0"/>
-              <a:t>4/03/2018</a:t>
+              <a:t>5/03/2018</a:t>
             </a:fld>
             <a:endParaRPr lang="en-AU"/>
           </a:p>
@@ -1103,7 +1455,7 @@
           <a:lstStyle/>
           <a:p>
             <a:r>
-              <a:rPr lang="en-US" smtClean="0"/>
+              <a:rPr lang="en-US"/>
               <a:t>Click to edit Master title style</a:t>
             </a:r>
             <a:endParaRPr lang="en-AU"/>
@@ -1132,35 +1484,35 @@
           <a:p>
             <a:pPr lvl="0"/>
             <a:r>
-              <a:rPr lang="en-US" smtClean="0"/>
+              <a:rPr lang="en-US"/>
               <a:t>Click to edit Master text styles</a:t>
             </a:r>
           </a:p>
           <a:p>
             <a:pPr lvl="1"/>
             <a:r>
-              <a:rPr lang="en-US" smtClean="0"/>
+              <a:rPr lang="en-US"/>
               <a:t>Second level</a:t>
             </a:r>
           </a:p>
           <a:p>
             <a:pPr lvl="2"/>
             <a:r>
-              <a:rPr lang="en-US" smtClean="0"/>
+              <a:rPr lang="en-US"/>
               <a:t>Third level</a:t>
             </a:r>
           </a:p>
           <a:p>
             <a:pPr lvl="3"/>
             <a:r>
-              <a:rPr lang="en-US" smtClean="0"/>
+              <a:rPr lang="en-US"/>
               <a:t>Fourth level</a:t>
             </a:r>
           </a:p>
           <a:p>
             <a:pPr lvl="4"/>
             <a:r>
-              <a:rPr lang="en-US" smtClean="0"/>
+              <a:rPr lang="en-US"/>
               <a:t>Fifth level</a:t>
             </a:r>
             <a:endParaRPr lang="en-AU"/>
@@ -1189,35 +1541,35 @@
           <a:p>
             <a:pPr lvl="0"/>
             <a:r>
-              <a:rPr lang="en-US" smtClean="0"/>
+              <a:rPr lang="en-US"/>
               <a:t>Click to edit Master text styles</a:t>
             </a:r>
           </a:p>
           <a:p>
             <a:pPr lvl="1"/>
             <a:r>
-              <a:rPr lang="en-US" smtClean="0"/>
+              <a:rPr lang="en-US"/>
               <a:t>Second level</a:t>
             </a:r>
           </a:p>
           <a:p>
             <a:pPr lvl="2"/>
             <a:r>
-              <a:rPr lang="en-US" smtClean="0"/>
+              <a:rPr lang="en-US"/>
               <a:t>Third level</a:t>
             </a:r>
           </a:p>
           <a:p>
             <a:pPr lvl="3"/>
             <a:r>
-              <a:rPr lang="en-US" smtClean="0"/>
+              <a:rPr lang="en-US"/>
               <a:t>Fourth level</a:t>
             </a:r>
           </a:p>
           <a:p>
             <a:pPr lvl="4"/>
             <a:r>
-              <a:rPr lang="en-US" smtClean="0"/>
+              <a:rPr lang="en-US"/>
               <a:t>Fifth level</a:t>
             </a:r>
             <a:endParaRPr lang="en-AU"/>
@@ -1241,7 +1593,7 @@
           <a:p>
             <a:fld id="{7E430E1D-FE5C-4BDB-89B6-57F9556F3DCF}" type="datetimeFigureOut">
               <a:rPr lang="en-AU" smtClean="0"/>
-              <a:t>4/03/2018</a:t>
+              <a:t>5/03/2018</a:t>
             </a:fld>
             <a:endParaRPr lang="en-AU"/>
           </a:p>
@@ -1340,7 +1692,7 @@
           <a:lstStyle/>
           <a:p>
             <a:r>
-              <a:rPr lang="en-US" smtClean="0"/>
+              <a:rPr lang="en-US"/>
               <a:t>Click to edit Master title style</a:t>
             </a:r>
             <a:endParaRPr lang="en-AU"/>
@@ -1406,7 +1758,7 @@
           <a:p>
             <a:pPr lvl="0"/>
             <a:r>
-              <a:rPr lang="en-US" smtClean="0"/>
+              <a:rPr lang="en-US"/>
               <a:t>Click to edit Master text styles</a:t>
             </a:r>
           </a:p>
@@ -1434,35 +1786,35 @@
           <a:p>
             <a:pPr lvl="0"/>
             <a:r>
-              <a:rPr lang="en-US" smtClean="0"/>
+              <a:rPr lang="en-US"/>
               <a:t>Click to edit Master text styles</a:t>
             </a:r>
           </a:p>
           <a:p>
             <a:pPr lvl="1"/>
             <a:r>
-              <a:rPr lang="en-US" smtClean="0"/>
+              <a:rPr lang="en-US"/>
               <a:t>Second level</a:t>
             </a:r>
           </a:p>
           <a:p>
             <a:pPr lvl="2"/>
             <a:r>
-              <a:rPr lang="en-US" smtClean="0"/>
+              <a:rPr lang="en-US"/>
               <a:t>Third level</a:t>
             </a:r>
           </a:p>
           <a:p>
             <a:pPr lvl="3"/>
             <a:r>
-              <a:rPr lang="en-US" smtClean="0"/>
+              <a:rPr lang="en-US"/>
               <a:t>Fourth level</a:t>
             </a:r>
           </a:p>
           <a:p>
             <a:pPr lvl="4"/>
             <a:r>
-              <a:rPr lang="en-US" smtClean="0"/>
+              <a:rPr lang="en-US"/>
               <a:t>Fifth level</a:t>
             </a:r>
             <a:endParaRPr lang="en-AU"/>
@@ -1528,7 +1880,7 @@
           <a:p>
             <a:pPr lvl="0"/>
             <a:r>
-              <a:rPr lang="en-US" smtClean="0"/>
+              <a:rPr lang="en-US"/>
               <a:t>Click to edit Master text styles</a:t>
             </a:r>
           </a:p>
@@ -1556,35 +1908,35 @@
           <a:p>
             <a:pPr lvl="0"/>
             <a:r>
-              <a:rPr lang="en-US" smtClean="0"/>
+              <a:rPr lang="en-US"/>
               <a:t>Click to edit Master text styles</a:t>
             </a:r>
           </a:p>
           <a:p>
             <a:pPr lvl="1"/>
             <a:r>
-              <a:rPr lang="en-US" smtClean="0"/>
+              <a:rPr lang="en-US"/>
               <a:t>Second level</a:t>
             </a:r>
           </a:p>
           <a:p>
             <a:pPr lvl="2"/>
             <a:r>
-              <a:rPr lang="en-US" smtClean="0"/>
+              <a:rPr lang="en-US"/>
               <a:t>Third level</a:t>
             </a:r>
           </a:p>
           <a:p>
             <a:pPr lvl="3"/>
             <a:r>
-              <a:rPr lang="en-US" smtClean="0"/>
+              <a:rPr lang="en-US"/>
               <a:t>Fourth level</a:t>
             </a:r>
           </a:p>
           <a:p>
             <a:pPr lvl="4"/>
             <a:r>
-              <a:rPr lang="en-US" smtClean="0"/>
+              <a:rPr lang="en-US"/>
               <a:t>Fifth level</a:t>
             </a:r>
             <a:endParaRPr lang="en-AU"/>
@@ -1608,7 +1960,7 @@
           <a:p>
             <a:fld id="{7E430E1D-FE5C-4BDB-89B6-57F9556F3DCF}" type="datetimeFigureOut">
               <a:rPr lang="en-AU" smtClean="0"/>
-              <a:t>4/03/2018</a:t>
+              <a:t>5/03/2018</a:t>
             </a:fld>
             <a:endParaRPr lang="en-AU"/>
           </a:p>
@@ -1702,7 +2054,7 @@
           <a:lstStyle/>
           <a:p>
             <a:r>
-              <a:rPr lang="en-US" smtClean="0"/>
+              <a:rPr lang="en-US"/>
               <a:t>Click to edit Master title style</a:t>
             </a:r>
             <a:endParaRPr lang="en-AU"/>
@@ -1726,7 +2078,7 @@
           <a:p>
             <a:fld id="{7E430E1D-FE5C-4BDB-89B6-57F9556F3DCF}" type="datetimeFigureOut">
               <a:rPr lang="en-AU" smtClean="0"/>
-              <a:t>4/03/2018</a:t>
+              <a:t>5/03/2018</a:t>
             </a:fld>
             <a:endParaRPr lang="en-AU"/>
           </a:p>
@@ -1821,7 +2173,7 @@
           <a:p>
             <a:fld id="{7E430E1D-FE5C-4BDB-89B6-57F9556F3DCF}" type="datetimeFigureOut">
               <a:rPr lang="en-AU" smtClean="0"/>
-              <a:t>4/03/2018</a:t>
+              <a:t>5/03/2018</a:t>
             </a:fld>
             <a:endParaRPr lang="en-AU"/>
           </a:p>
@@ -1924,7 +2276,7 @@
           </a:lstStyle>
           <a:p>
             <a:r>
-              <a:rPr lang="en-US" smtClean="0"/>
+              <a:rPr lang="en-US"/>
               <a:t>Click to edit Master title style</a:t>
             </a:r>
             <a:endParaRPr lang="en-AU"/>
@@ -1981,35 +2333,35 @@
           <a:p>
             <a:pPr lvl="0"/>
             <a:r>
-              <a:rPr lang="en-US" smtClean="0"/>
+              <a:rPr lang="en-US"/>
               <a:t>Click to edit Master text styles</a:t>
             </a:r>
           </a:p>
           <a:p>
             <a:pPr lvl="1"/>
             <a:r>
-              <a:rPr lang="en-US" smtClean="0"/>
+              <a:rPr lang="en-US"/>
               <a:t>Second level</a:t>
             </a:r>
           </a:p>
           <a:p>
             <a:pPr lvl="2"/>
             <a:r>
-              <a:rPr lang="en-US" smtClean="0"/>
+              <a:rPr lang="en-US"/>
               <a:t>Third level</a:t>
             </a:r>
           </a:p>
           <a:p>
             <a:pPr lvl="3"/>
             <a:r>
-              <a:rPr lang="en-US" smtClean="0"/>
+              <a:rPr lang="en-US"/>
               <a:t>Fourth level</a:t>
             </a:r>
           </a:p>
           <a:p>
             <a:pPr lvl="4"/>
             <a:r>
-              <a:rPr lang="en-US" smtClean="0"/>
+              <a:rPr lang="en-US"/>
               <a:t>Fifth level</a:t>
             </a:r>
             <a:endParaRPr lang="en-AU"/>
@@ -2075,7 +2427,7 @@
           <a:p>
             <a:pPr lvl="0"/>
             <a:r>
-              <a:rPr lang="en-US" smtClean="0"/>
+              <a:rPr lang="en-US"/>
               <a:t>Click to edit Master text styles</a:t>
             </a:r>
           </a:p>
@@ -2098,7 +2450,7 @@
           <a:p>
             <a:fld id="{7E430E1D-FE5C-4BDB-89B6-57F9556F3DCF}" type="datetimeFigureOut">
               <a:rPr lang="en-AU" smtClean="0"/>
-              <a:t>4/03/2018</a:t>
+              <a:t>5/03/2018</a:t>
             </a:fld>
             <a:endParaRPr lang="en-AU"/>
           </a:p>
@@ -2201,7 +2553,7 @@
           </a:lstStyle>
           <a:p>
             <a:r>
-              <a:rPr lang="en-US" smtClean="0"/>
+              <a:rPr lang="en-US"/>
               <a:t>Click to edit Master title style</a:t>
             </a:r>
             <a:endParaRPr lang="en-AU"/>
@@ -2328,7 +2680,7 @@
           <a:p>
             <a:pPr lvl="0"/>
             <a:r>
-              <a:rPr lang="en-US" smtClean="0"/>
+              <a:rPr lang="en-US"/>
               <a:t>Click to edit Master text styles</a:t>
             </a:r>
           </a:p>
@@ -2351,7 +2703,7 @@
           <a:p>
             <a:fld id="{7E430E1D-FE5C-4BDB-89B6-57F9556F3DCF}" type="datetimeFigureOut">
               <a:rPr lang="en-AU" smtClean="0"/>
-              <a:t>4/03/2018</a:t>
+              <a:t>5/03/2018</a:t>
             </a:fld>
             <a:endParaRPr lang="en-AU"/>
           </a:p>
@@ -2460,7 +2812,7 @@
           <a:lstStyle/>
           <a:p>
             <a:r>
-              <a:rPr lang="en-US" smtClean="0"/>
+              <a:rPr lang="en-US"/>
               <a:t>Click to edit Master title style</a:t>
             </a:r>
             <a:endParaRPr lang="en-AU"/>
@@ -2494,35 +2846,35 @@
           <a:p>
             <a:pPr lvl="0"/>
             <a:r>
-              <a:rPr lang="en-US" smtClean="0"/>
+              <a:rPr lang="en-US"/>
               <a:t>Click to edit Master text styles</a:t>
             </a:r>
           </a:p>
           <a:p>
             <a:pPr lvl="1"/>
             <a:r>
-              <a:rPr lang="en-US" smtClean="0"/>
+              <a:rPr lang="en-US"/>
               <a:t>Second level</a:t>
             </a:r>
           </a:p>
           <a:p>
             <a:pPr lvl="2"/>
             <a:r>
-              <a:rPr lang="en-US" smtClean="0"/>
+              <a:rPr lang="en-US"/>
               <a:t>Third level</a:t>
             </a:r>
           </a:p>
           <a:p>
             <a:pPr lvl="3"/>
             <a:r>
-              <a:rPr lang="en-US" smtClean="0"/>
+              <a:rPr lang="en-US"/>
               <a:t>Fourth level</a:t>
             </a:r>
           </a:p>
           <a:p>
             <a:pPr lvl="4"/>
             <a:r>
-              <a:rPr lang="en-US" smtClean="0"/>
+              <a:rPr lang="en-US"/>
               <a:t>Fifth level</a:t>
             </a:r>
             <a:endParaRPr lang="en-AU"/>
@@ -2564,7 +2916,7 @@
           <a:p>
             <a:fld id="{7E430E1D-FE5C-4BDB-89B6-57F9556F3DCF}" type="datetimeFigureOut">
               <a:rPr lang="en-AU" smtClean="0"/>
-              <a:t>4/03/2018</a:t>
+              <a:t>5/03/2018</a:t>
             </a:fld>
             <a:endParaRPr lang="en-AU"/>
           </a:p>
@@ -2992,18 +3344,23 @@
           <a:lstStyle/>
           <a:p>
             <a:r>
-              <a:rPr lang="en-AU" dirty="0" smtClean="0"/>
+              <a:rPr lang="en-AU" dirty="0">
+                <a:latin typeface="Gill Sans MT" panose="020B0502020104020203" pitchFamily="34" charset="0"/>
+              </a:rPr>
               <a:t>ANU </a:t>
             </a:r>
             <a:r>
-              <a:rPr lang="en-AU" dirty="0" err="1" smtClean="0"/>
-              <a:t>Techlauncher</a:t>
-            </a:r>
-            <a:r>
-              <a:rPr lang="en-AU" dirty="0" smtClean="0"/>
+              <a:rPr lang="en-AU" dirty="0" err="1">
+                <a:latin typeface="Gill Sans MT" panose="020B0502020104020203" pitchFamily="34" charset="0"/>
+              </a:rPr>
+              <a:t>TechLauncher</a:t>
+            </a:r>
+            <a:r>
+              <a:rPr lang="en-AU" dirty="0">
+                <a:latin typeface="Gill Sans MT" panose="020B0502020104020203" pitchFamily="34" charset="0"/>
+              </a:rPr>
               <a:t> Sem-1 2018</a:t>
             </a:r>
-            <a:endParaRPr lang="en-AU" dirty="0"/>
           </a:p>
         </p:txBody>
       </p:sp>
@@ -3028,41 +3385,838 @@
           <a:lstStyle/>
           <a:p>
             <a:r>
-              <a:rPr lang="en-AU" dirty="0" err="1" smtClean="0"/>
+              <a:rPr lang="en-AU" dirty="0" err="1">
+                <a:latin typeface="Gill Sans MT" panose="020B0502020104020203" pitchFamily="34" charset="0"/>
+              </a:rPr>
               <a:t>CourseAI</a:t>
             </a:r>
             <a:r>
-              <a:rPr lang="en-AU" dirty="0" smtClean="0"/>
+              <a:rPr lang="en-AU" dirty="0">
+                <a:latin typeface="Gill Sans MT" panose="020B0502020104020203" pitchFamily="34" charset="0"/>
+              </a:rPr>
               <a:t> Schedule with Milestones</a:t>
             </a:r>
-            <a:endParaRPr lang="en-AU" dirty="0"/>
           </a:p>
         </p:txBody>
       </p:sp>
       <p:pic>
         <p:nvPicPr>
-          <p:cNvPr id="5" name="Picture 4"/>
+          <p:cNvPr id="12" name="Picture 11">
+            <a:extLst>
+              <a:ext uri="{FF2B5EF4-FFF2-40B4-BE49-F238E27FC236}">
+                <a16:creationId xmlns:a16="http://schemas.microsoft.com/office/drawing/2014/main" id="{B9A3149F-9333-49E3-B38E-678CE3C9A0D6}"/>
+              </a:ext>
+            </a:extLst>
+          </p:cNvPr>
           <p:cNvPicPr>
             <a:picLocks noChangeAspect="1"/>
           </p:cNvPicPr>
           <p:nvPr/>
         </p:nvPicPr>
         <p:blipFill>
-          <a:blip r:embed="rId2"/>
+          <a:blip r:embed="rId2">
+            <a:extLst>
+              <a:ext uri="{28A0092B-C50C-407E-A947-70E740481C1C}">
+                <a14:useLocalDpi xmlns:a14="http://schemas.microsoft.com/office/drawing/2010/main" val="0"/>
+              </a:ext>
+            </a:extLst>
+          </a:blip>
           <a:stretch>
             <a:fillRect/>
           </a:stretch>
         </p:blipFill>
         <p:spPr>
           <a:xfrm>
-            <a:off x="0" y="2633329"/>
-            <a:ext cx="12192000" cy="1591342"/>
+            <a:off x="0" y="1344385"/>
+            <a:ext cx="12192000" cy="1768045"/>
           </a:xfrm>
           <a:prstGeom prst="rect">
             <a:avLst/>
           </a:prstGeom>
         </p:spPr>
       </p:pic>
+      <p:graphicFrame>
+        <p:nvGraphicFramePr>
+          <p:cNvPr id="13" name="Content Placeholder 3">
+            <a:extLst>
+              <a:ext uri="{FF2B5EF4-FFF2-40B4-BE49-F238E27FC236}">
+                <a16:creationId xmlns:a16="http://schemas.microsoft.com/office/drawing/2014/main" id="{918E383F-5DDC-4DD6-B4DF-EE3385D9723A}"/>
+              </a:ext>
+            </a:extLst>
+          </p:cNvPr>
+          <p:cNvGraphicFramePr>
+            <a:graphicFrameLocks/>
+          </p:cNvGraphicFramePr>
+          <p:nvPr>
+            <p:extLst>
+              <p:ext uri="{D42A27DB-BD31-4B8C-83A1-F6EECF244321}">
+                <p14:modId xmlns:p14="http://schemas.microsoft.com/office/powerpoint/2010/main" val="2570560488"/>
+              </p:ext>
+            </p:extLst>
+          </p:nvPr>
+        </p:nvGraphicFramePr>
+        <p:xfrm>
+          <a:off x="159657" y="3429000"/>
+          <a:ext cx="11872686" cy="3294016"/>
+        </p:xfrm>
+        <a:graphic>
+          <a:graphicData uri="http://schemas.openxmlformats.org/drawingml/2006/table">
+            <a:tbl>
+              <a:tblPr firstRow="1" bandRow="1">
+                <a:tableStyleId>{5C22544A-7EE6-4342-B048-85BDC9FD1C3A}</a:tableStyleId>
+              </a:tblPr>
+              <a:tblGrid>
+                <a:gridCol w="1978781">
+                  <a:extLst>
+                    <a:ext uri="{9D8B030D-6E8A-4147-A177-3AD203B41FA5}">
+                      <a16:colId xmlns:a16="http://schemas.microsoft.com/office/drawing/2014/main" val="493534122"/>
+                    </a:ext>
+                  </a:extLst>
+                </a:gridCol>
+                <a:gridCol w="1978781">
+                  <a:extLst>
+                    <a:ext uri="{9D8B030D-6E8A-4147-A177-3AD203B41FA5}">
+                      <a16:colId xmlns:a16="http://schemas.microsoft.com/office/drawing/2014/main" val="3645944336"/>
+                    </a:ext>
+                  </a:extLst>
+                </a:gridCol>
+                <a:gridCol w="1978781">
+                  <a:extLst>
+                    <a:ext uri="{9D8B030D-6E8A-4147-A177-3AD203B41FA5}">
+                      <a16:colId xmlns:a16="http://schemas.microsoft.com/office/drawing/2014/main" val="1088142542"/>
+                    </a:ext>
+                  </a:extLst>
+                </a:gridCol>
+                <a:gridCol w="1978781">
+                  <a:extLst>
+                    <a:ext uri="{9D8B030D-6E8A-4147-A177-3AD203B41FA5}">
+                      <a16:colId xmlns:a16="http://schemas.microsoft.com/office/drawing/2014/main" val="2489520425"/>
+                    </a:ext>
+                  </a:extLst>
+                </a:gridCol>
+                <a:gridCol w="1978781">
+                  <a:extLst>
+                    <a:ext uri="{9D8B030D-6E8A-4147-A177-3AD203B41FA5}">
+                      <a16:colId xmlns:a16="http://schemas.microsoft.com/office/drawing/2014/main" val="3573065895"/>
+                    </a:ext>
+                  </a:extLst>
+                </a:gridCol>
+                <a:gridCol w="1978781">
+                  <a:extLst>
+                    <a:ext uri="{9D8B030D-6E8A-4147-A177-3AD203B41FA5}">
+                      <a16:colId xmlns:a16="http://schemas.microsoft.com/office/drawing/2014/main" val="1653123825"/>
+                    </a:ext>
+                  </a:extLst>
+                </a:gridCol>
+              </a:tblGrid>
+              <a:tr h="3294016">
+                <a:tc>
+                  <a:txBody>
+                    <a:bodyPr/>
+                    <a:lstStyle/>
+                    <a:p>
+                      <a:r>
+                        <a:rPr lang="en-US" sz="1200" b="1" dirty="0">
+                          <a:solidFill>
+                            <a:schemeClr val="tx1"/>
+                          </a:solidFill>
+                          <a:latin typeface="Gill Sans MT" panose="020B0502020104020203" pitchFamily="34" charset="0"/>
+                        </a:rPr>
+                        <a:t>Kick Off</a:t>
+                      </a:r>
+                      <a:endParaRPr lang="en-US" sz="1200" dirty="0">
+                        <a:solidFill>
+                          <a:schemeClr val="tx1"/>
+                        </a:solidFill>
+                        <a:latin typeface="Gill Sans MT" panose="020B0502020104020203" pitchFamily="34" charset="0"/>
+                      </a:endParaRPr>
+                    </a:p>
+                    <a:p>
+                      <a:pPr marL="285750" indent="-285750">
+                        <a:buFont typeface="Wingdings" panose="05000000000000000000" pitchFamily="2" charset="2"/>
+                        <a:buChar char="ü"/>
+                      </a:pPr>
+                      <a:r>
+                        <a:rPr lang="en-US" sz="1200" b="0" dirty="0">
+                          <a:solidFill>
+                            <a:schemeClr val="tx1"/>
+                          </a:solidFill>
+                          <a:latin typeface="Gill Sans MT" panose="020B0502020104020203" pitchFamily="34" charset="0"/>
+                        </a:rPr>
+                        <a:t>Team introductions</a:t>
+                      </a:r>
+                    </a:p>
+                    <a:p>
+                      <a:pPr marL="285750" indent="-285750">
+                        <a:buFont typeface="Wingdings" panose="05000000000000000000" pitchFamily="2" charset="2"/>
+                        <a:buChar char="ü"/>
+                      </a:pPr>
+                      <a:r>
+                        <a:rPr lang="en-US" sz="1200" b="0" dirty="0" err="1">
+                          <a:solidFill>
+                            <a:schemeClr val="tx1"/>
+                          </a:solidFill>
+                          <a:latin typeface="Gill Sans MT" panose="020B0502020104020203" pitchFamily="34" charset="0"/>
+                        </a:rPr>
+                        <a:t>TechLauncher</a:t>
+                      </a:r>
+                      <a:r>
+                        <a:rPr lang="en-US" sz="1200" b="0" dirty="0">
+                          <a:solidFill>
+                            <a:schemeClr val="tx1"/>
+                          </a:solidFill>
+                          <a:latin typeface="Gill Sans MT" panose="020B0502020104020203" pitchFamily="34" charset="0"/>
+                        </a:rPr>
+                        <a:t> induction workshop</a:t>
+                      </a:r>
+                    </a:p>
+                    <a:p>
+                      <a:pPr marL="285750" indent="-285750">
+                        <a:buFont typeface="Wingdings" panose="05000000000000000000" pitchFamily="2" charset="2"/>
+                        <a:buChar char="ü"/>
+                      </a:pPr>
+                      <a:r>
+                        <a:rPr lang="en-US" sz="1200" b="0" dirty="0">
+                          <a:solidFill>
+                            <a:schemeClr val="tx1"/>
+                          </a:solidFill>
+                          <a:latin typeface="Gill Sans MT" panose="020B0502020104020203" pitchFamily="34" charset="0"/>
+                        </a:rPr>
+                        <a:t>Kick off meetings with clients at Accenture</a:t>
+                      </a:r>
+                    </a:p>
+                    <a:p>
+                      <a:endParaRPr lang="en-AU" sz="1200" dirty="0">
+                        <a:solidFill>
+                          <a:schemeClr val="tx1"/>
+                        </a:solidFill>
+                        <a:latin typeface="Gill Sans MT" panose="020B0502020104020203" pitchFamily="34" charset="0"/>
+                      </a:endParaRPr>
+                    </a:p>
+                  </a:txBody>
+                  <a:tcPr>
+                    <a:solidFill>
+                      <a:schemeClr val="bg1"/>
+                    </a:solidFill>
+                  </a:tcPr>
+                </a:tc>
+                <a:tc>
+                  <a:txBody>
+                    <a:bodyPr/>
+                    <a:lstStyle/>
+                    <a:p>
+                      <a:r>
+                        <a:rPr lang="en-US" sz="1200" b="1" dirty="0">
+                          <a:solidFill>
+                            <a:schemeClr val="tx1"/>
+                          </a:solidFill>
+                          <a:latin typeface="Gill Sans MT" panose="020B0502020104020203" pitchFamily="34" charset="0"/>
+                        </a:rPr>
+                        <a:t>Define</a:t>
+                      </a:r>
+                    </a:p>
+                    <a:p>
+                      <a:pPr marL="285750" indent="-285750">
+                        <a:buFont typeface="Wingdings" panose="05000000000000000000" pitchFamily="2" charset="2"/>
+                        <a:buChar char="ü"/>
+                      </a:pPr>
+                      <a:r>
+                        <a:rPr lang="en-US" sz="1200" b="0" dirty="0">
+                          <a:solidFill>
+                            <a:schemeClr val="tx1"/>
+                          </a:solidFill>
+                          <a:latin typeface="Gill Sans MT" panose="020B0502020104020203" pitchFamily="34" charset="0"/>
+                        </a:rPr>
+                        <a:t>Deploy fake chatbot on Facebook for data collection (Sprint 1)</a:t>
+                      </a:r>
+                    </a:p>
+                    <a:p>
+                      <a:pPr marL="285750" indent="-285750">
+                        <a:buFont typeface="Wingdings" panose="05000000000000000000" pitchFamily="2" charset="2"/>
+                        <a:buChar char="ü"/>
+                      </a:pPr>
+                      <a:r>
+                        <a:rPr lang="en-US" sz="1200" b="0" dirty="0">
+                          <a:solidFill>
+                            <a:schemeClr val="tx1"/>
+                          </a:solidFill>
+                          <a:latin typeface="Gill Sans MT" panose="020B0502020104020203" pitchFamily="34" charset="0"/>
+                        </a:rPr>
+                        <a:t>Prepare and send out survey to ANU students</a:t>
+                      </a:r>
+                    </a:p>
+                    <a:p>
+                      <a:pPr marL="285750" indent="-285750">
+                        <a:buFont typeface="Wingdings" panose="05000000000000000000" pitchFamily="2" charset="2"/>
+                        <a:buChar char="ü"/>
+                      </a:pPr>
+                      <a:r>
+                        <a:rPr lang="en-US" sz="1200" b="0" dirty="0">
+                          <a:solidFill>
+                            <a:schemeClr val="tx1"/>
+                          </a:solidFill>
+                          <a:latin typeface="Gill Sans MT" panose="020B0502020104020203" pitchFamily="34" charset="0"/>
+                        </a:rPr>
+                        <a:t>Clean data and prepare statistics for fake chat bot</a:t>
+                      </a:r>
+                    </a:p>
+                    <a:p>
+                      <a:pPr marL="285750" indent="-285750">
+                        <a:buFont typeface="Wingdings" panose="05000000000000000000" pitchFamily="2" charset="2"/>
+                        <a:buChar char="ü"/>
+                      </a:pPr>
+                      <a:r>
+                        <a:rPr lang="en-US" sz="1200" b="0" dirty="0">
+                          <a:solidFill>
+                            <a:schemeClr val="tx1"/>
+                          </a:solidFill>
+                          <a:latin typeface="Gill Sans MT" panose="020B0502020104020203" pitchFamily="34" charset="0"/>
+                        </a:rPr>
+                        <a:t>Using the fake chatbot and survey data, decide what functionalities are most important (Sprint 2)</a:t>
+                      </a:r>
+                    </a:p>
+                    <a:p>
+                      <a:endParaRPr lang="en-AU" sz="1200" dirty="0">
+                        <a:solidFill>
+                          <a:schemeClr val="tx1"/>
+                        </a:solidFill>
+                        <a:latin typeface="Gill Sans MT" panose="020B0502020104020203" pitchFamily="34" charset="0"/>
+                      </a:endParaRPr>
+                    </a:p>
+                  </a:txBody>
+                  <a:tcPr>
+                    <a:solidFill>
+                      <a:schemeClr val="bg1"/>
+                    </a:solidFill>
+                  </a:tcPr>
+                </a:tc>
+                <a:tc>
+                  <a:txBody>
+                    <a:bodyPr/>
+                    <a:lstStyle/>
+                    <a:p>
+                      <a:r>
+                        <a:rPr lang="en-US" sz="1200" b="1" dirty="0">
+                          <a:solidFill>
+                            <a:schemeClr val="tx1">
+                              <a:lumMod val="50000"/>
+                              <a:lumOff val="50000"/>
+                            </a:schemeClr>
+                          </a:solidFill>
+                          <a:latin typeface="Gill Sans MT" panose="020B0502020104020203" pitchFamily="34" charset="0"/>
+                        </a:rPr>
+                        <a:t>Ideate</a:t>
+                      </a:r>
+                    </a:p>
+                    <a:p>
+                      <a:pPr marL="285750" indent="-285750">
+                        <a:buFont typeface="Wingdings" panose="05000000000000000000" pitchFamily="2" charset="2"/>
+                        <a:buChar char="ü"/>
+                      </a:pPr>
+                      <a:r>
+                        <a:rPr lang="en-US" sz="1200" b="0" dirty="0">
+                          <a:solidFill>
+                            <a:schemeClr val="tx1">
+                              <a:lumMod val="50000"/>
+                              <a:lumOff val="50000"/>
+                            </a:schemeClr>
+                          </a:solidFill>
+                          <a:latin typeface="Gill Sans MT" panose="020B0502020104020203" pitchFamily="34" charset="0"/>
+                        </a:rPr>
+                        <a:t>Brainstorm designs and concepts (Sprint 3)</a:t>
+                      </a:r>
+                    </a:p>
+                    <a:p>
+                      <a:pPr marL="285750" indent="-285750">
+                        <a:buFont typeface="Wingdings" panose="05000000000000000000" pitchFamily="2" charset="2"/>
+                        <a:buChar char="ü"/>
+                      </a:pPr>
+                      <a:r>
+                        <a:rPr lang="en-US" sz="1200" b="0" dirty="0">
+                          <a:solidFill>
+                            <a:schemeClr val="tx1">
+                              <a:lumMod val="50000"/>
+                              <a:lumOff val="50000"/>
+                            </a:schemeClr>
+                          </a:solidFill>
+                          <a:latin typeface="Gill Sans MT" panose="020B0502020104020203" pitchFamily="34" charset="0"/>
+                        </a:rPr>
+                        <a:t>Decide how to combine the functionality that the system needs into a single product.</a:t>
+                      </a:r>
+                    </a:p>
+                    <a:p>
+                      <a:pPr marL="285750" indent="-285750">
+                        <a:buFont typeface="Wingdings" panose="05000000000000000000" pitchFamily="2" charset="2"/>
+                        <a:buChar char="ü"/>
+                      </a:pPr>
+                      <a:r>
+                        <a:rPr lang="en-US" sz="1200" b="0" dirty="0">
+                          <a:solidFill>
+                            <a:schemeClr val="tx1">
+                              <a:lumMod val="50000"/>
+                              <a:lumOff val="50000"/>
+                            </a:schemeClr>
+                          </a:solidFill>
+                          <a:latin typeface="Gill Sans MT" panose="020B0502020104020203" pitchFamily="34" charset="0"/>
+                        </a:rPr>
+                        <a:t>Meet with Accenture to hear their feedback</a:t>
+                      </a:r>
+                    </a:p>
+                    <a:p>
+                      <a:pPr marL="285750" indent="-285750">
+                        <a:buFont typeface="Wingdings" panose="05000000000000000000" pitchFamily="2" charset="2"/>
+                        <a:buChar char="ü"/>
+                      </a:pPr>
+                      <a:r>
+                        <a:rPr lang="en-US" sz="1200" b="0" dirty="0">
+                          <a:solidFill>
+                            <a:schemeClr val="tx1">
+                              <a:lumMod val="50000"/>
+                              <a:lumOff val="50000"/>
+                            </a:schemeClr>
+                          </a:solidFill>
+                          <a:latin typeface="Gill Sans MT" panose="020B0502020104020203" pitchFamily="34" charset="0"/>
+                        </a:rPr>
+                        <a:t>Brainstorm options for tech stack</a:t>
+                      </a:r>
+                    </a:p>
+                    <a:p>
+                      <a:pPr marL="285750" indent="-285750">
+                        <a:buFont typeface="Wingdings" panose="05000000000000000000" pitchFamily="2" charset="2"/>
+                        <a:buChar char="ü"/>
+                      </a:pPr>
+                      <a:r>
+                        <a:rPr lang="en-US" sz="1200" b="0" dirty="0">
+                          <a:solidFill>
+                            <a:schemeClr val="tx1">
+                              <a:lumMod val="50000"/>
+                              <a:lumOff val="50000"/>
+                            </a:schemeClr>
+                          </a:solidFill>
+                          <a:latin typeface="Gill Sans MT" panose="020B0502020104020203" pitchFamily="34" charset="0"/>
+                        </a:rPr>
+                        <a:t>Prototype options for recommendations AI model (Sprint 4)</a:t>
+                      </a:r>
+                    </a:p>
+                  </a:txBody>
+                  <a:tcPr>
+                    <a:solidFill>
+                      <a:schemeClr val="bg1"/>
+                    </a:solidFill>
+                  </a:tcPr>
+                </a:tc>
+                <a:tc>
+                  <a:txBody>
+                    <a:bodyPr/>
+                    <a:lstStyle/>
+                    <a:p>
+                      <a:r>
+                        <a:rPr lang="en-US" sz="1200" b="1" dirty="0">
+                          <a:solidFill>
+                            <a:schemeClr val="tx1">
+                              <a:lumMod val="50000"/>
+                              <a:lumOff val="50000"/>
+                            </a:schemeClr>
+                          </a:solidFill>
+                          <a:latin typeface="Gill Sans MT" panose="020B0502020104020203" pitchFamily="34" charset="0"/>
+                        </a:rPr>
+                        <a:t>Prototype</a:t>
+                      </a:r>
+                    </a:p>
+                    <a:p>
+                      <a:pPr marL="285750" indent="-285750">
+                        <a:buFont typeface="Wingdings" panose="05000000000000000000" pitchFamily="2" charset="2"/>
+                        <a:buChar char="ü"/>
+                      </a:pPr>
+                      <a:r>
+                        <a:rPr lang="en-US" sz="1200" b="0" dirty="0">
+                          <a:solidFill>
+                            <a:schemeClr val="tx1">
+                              <a:lumMod val="50000"/>
+                              <a:lumOff val="50000"/>
+                            </a:schemeClr>
+                          </a:solidFill>
+                          <a:latin typeface="Gill Sans MT" panose="020B0502020104020203" pitchFamily="34" charset="0"/>
+                        </a:rPr>
+                        <a:t>Create high level design for the </a:t>
+                      </a:r>
+                      <a:r>
+                        <a:rPr lang="en-US" sz="1200" b="0" dirty="0" err="1">
+                          <a:solidFill>
+                            <a:schemeClr val="tx1">
+                              <a:lumMod val="50000"/>
+                              <a:lumOff val="50000"/>
+                            </a:schemeClr>
+                          </a:solidFill>
+                          <a:latin typeface="Gill Sans MT" panose="020B0502020104020203" pitchFamily="34" charset="0"/>
+                        </a:rPr>
+                        <a:t>finalised</a:t>
+                      </a:r>
+                      <a:r>
+                        <a:rPr lang="en-US" sz="1200" b="0" dirty="0">
+                          <a:solidFill>
+                            <a:schemeClr val="tx1">
+                              <a:lumMod val="50000"/>
+                              <a:lumOff val="50000"/>
+                            </a:schemeClr>
+                          </a:solidFill>
+                          <a:latin typeface="Gill Sans MT" panose="020B0502020104020203" pitchFamily="34" charset="0"/>
+                        </a:rPr>
+                        <a:t> product (Sprint 5)</a:t>
+                      </a:r>
+                    </a:p>
+                    <a:p>
+                      <a:pPr marL="285750" indent="-285750">
+                        <a:buFont typeface="Wingdings" panose="05000000000000000000" pitchFamily="2" charset="2"/>
+                        <a:buChar char="ü"/>
+                      </a:pPr>
+                      <a:r>
+                        <a:rPr lang="en-US" sz="1200" b="0" dirty="0">
+                          <a:solidFill>
+                            <a:schemeClr val="tx1">
+                              <a:lumMod val="50000"/>
+                              <a:lumOff val="50000"/>
+                            </a:schemeClr>
+                          </a:solidFill>
+                          <a:latin typeface="Gill Sans MT" panose="020B0502020104020203" pitchFamily="34" charset="0"/>
+                        </a:rPr>
+                        <a:t>Decide on the tech stack</a:t>
+                      </a:r>
+                    </a:p>
+                    <a:p>
+                      <a:pPr marL="285750" indent="-285750">
+                        <a:buFont typeface="Wingdings" panose="05000000000000000000" pitchFamily="2" charset="2"/>
+                        <a:buChar char="ü"/>
+                      </a:pPr>
+                      <a:r>
+                        <a:rPr lang="en-US" sz="1200" b="0" dirty="0">
+                          <a:solidFill>
+                            <a:schemeClr val="tx1">
+                              <a:lumMod val="50000"/>
+                              <a:lumOff val="50000"/>
+                            </a:schemeClr>
+                          </a:solidFill>
+                          <a:latin typeface="Gill Sans MT" panose="020B0502020104020203" pitchFamily="34" charset="0"/>
+                        </a:rPr>
+                        <a:t>Complete task chunking for first prototype</a:t>
+                      </a:r>
+                    </a:p>
+                    <a:p>
+                      <a:pPr marL="285750" indent="-285750">
+                        <a:buFont typeface="Wingdings" panose="05000000000000000000" pitchFamily="2" charset="2"/>
+                        <a:buChar char="ü"/>
+                      </a:pPr>
+                      <a:r>
+                        <a:rPr lang="en-US" sz="1200" b="0" dirty="0">
+                          <a:solidFill>
+                            <a:schemeClr val="tx1">
+                              <a:lumMod val="50000"/>
+                              <a:lumOff val="50000"/>
+                            </a:schemeClr>
+                          </a:solidFill>
+                          <a:latin typeface="Gill Sans MT" panose="020B0502020104020203" pitchFamily="34" charset="0"/>
+                        </a:rPr>
+                        <a:t>Meet to assign responsibilities in prototype creation</a:t>
+                      </a:r>
+                    </a:p>
+                    <a:p>
+                      <a:pPr marL="285750" indent="-285750">
+                        <a:buFont typeface="Wingdings" panose="05000000000000000000" pitchFamily="2" charset="2"/>
+                        <a:buChar char="ü"/>
+                      </a:pPr>
+                      <a:r>
+                        <a:rPr lang="en-US" sz="1200" b="0" dirty="0">
+                          <a:solidFill>
+                            <a:schemeClr val="tx1">
+                              <a:lumMod val="50000"/>
+                              <a:lumOff val="50000"/>
+                            </a:schemeClr>
+                          </a:solidFill>
+                          <a:latin typeface="Gill Sans MT" panose="020B0502020104020203" pitchFamily="34" charset="0"/>
+                        </a:rPr>
+                        <a:t>Code prototype (Sprint 6)</a:t>
+                      </a:r>
+                    </a:p>
+                    <a:p>
+                      <a:pPr marL="285750" indent="-285750">
+                        <a:buFont typeface="Wingdings" panose="05000000000000000000" pitchFamily="2" charset="2"/>
+                        <a:buChar char="ü"/>
+                      </a:pPr>
+                      <a:r>
+                        <a:rPr lang="en-US" sz="1200" b="0" dirty="0">
+                          <a:solidFill>
+                            <a:schemeClr val="tx1">
+                              <a:lumMod val="50000"/>
+                              <a:lumOff val="50000"/>
+                            </a:schemeClr>
+                          </a:solidFill>
+                          <a:latin typeface="Gill Sans MT" panose="020B0502020104020203" pitchFamily="34" charset="0"/>
+                        </a:rPr>
+                        <a:t>Code reviews</a:t>
+                      </a:r>
+                    </a:p>
+                    <a:p>
+                      <a:endParaRPr lang="en-AU" sz="1200" dirty="0">
+                        <a:solidFill>
+                          <a:schemeClr val="tx1">
+                            <a:lumMod val="50000"/>
+                            <a:lumOff val="50000"/>
+                          </a:schemeClr>
+                        </a:solidFill>
+                        <a:latin typeface="Gill Sans MT" panose="020B0502020104020203" pitchFamily="34" charset="0"/>
+                      </a:endParaRPr>
+                    </a:p>
+                  </a:txBody>
+                  <a:tcPr>
+                    <a:solidFill>
+                      <a:schemeClr val="bg1"/>
+                    </a:solidFill>
+                  </a:tcPr>
+                </a:tc>
+                <a:tc>
+                  <a:txBody>
+                    <a:bodyPr/>
+                    <a:lstStyle/>
+                    <a:p>
+                      <a:r>
+                        <a:rPr lang="en-US" sz="1200" b="1" dirty="0">
+                          <a:solidFill>
+                            <a:schemeClr val="tx1">
+                              <a:lumMod val="50000"/>
+                              <a:lumOff val="50000"/>
+                            </a:schemeClr>
+                          </a:solidFill>
+                          <a:latin typeface="Gill Sans MT" panose="020B0502020104020203" pitchFamily="34" charset="0"/>
+                        </a:rPr>
+                        <a:t>Test</a:t>
+                      </a:r>
+                    </a:p>
+                    <a:p>
+                      <a:pPr marL="285750" indent="-285750">
+                        <a:buFont typeface="Wingdings" panose="05000000000000000000" pitchFamily="2" charset="2"/>
+                        <a:buChar char="ü"/>
+                      </a:pPr>
+                      <a:r>
+                        <a:rPr lang="en-US" sz="1200" b="0" dirty="0">
+                          <a:solidFill>
+                            <a:schemeClr val="tx1">
+                              <a:lumMod val="50000"/>
+                              <a:lumOff val="50000"/>
+                            </a:schemeClr>
+                          </a:solidFill>
+                          <a:latin typeface="Gill Sans MT" panose="020B0502020104020203" pitchFamily="34" charset="0"/>
+                        </a:rPr>
+                        <a:t>Deploy prototype through designated medium (Sprint 7)</a:t>
+                      </a:r>
+                    </a:p>
+                    <a:p>
+                      <a:pPr marL="285750" indent="-285750">
+                        <a:buFont typeface="Wingdings" panose="05000000000000000000" pitchFamily="2" charset="2"/>
+                        <a:buChar char="ü"/>
+                      </a:pPr>
+                      <a:r>
+                        <a:rPr lang="en-US" sz="1200" b="0" dirty="0">
+                          <a:solidFill>
+                            <a:schemeClr val="tx1">
+                              <a:lumMod val="50000"/>
+                              <a:lumOff val="50000"/>
+                            </a:schemeClr>
+                          </a:solidFill>
+                          <a:latin typeface="Gill Sans MT" panose="020B0502020104020203" pitchFamily="34" charset="0"/>
+                        </a:rPr>
+                        <a:t>Prepare new survey for product</a:t>
+                      </a:r>
+                    </a:p>
+                    <a:p>
+                      <a:pPr marL="285750" indent="-285750">
+                        <a:buFont typeface="Wingdings" panose="05000000000000000000" pitchFamily="2" charset="2"/>
+                        <a:buChar char="ü"/>
+                      </a:pPr>
+                      <a:r>
+                        <a:rPr lang="en-US" sz="1200" b="0" dirty="0">
+                          <a:solidFill>
+                            <a:schemeClr val="tx1">
+                              <a:lumMod val="50000"/>
+                              <a:lumOff val="50000"/>
+                            </a:schemeClr>
+                          </a:solidFill>
+                          <a:latin typeface="Gill Sans MT" panose="020B0502020104020203" pitchFamily="34" charset="0"/>
+                        </a:rPr>
+                        <a:t>Deploy survey to product users</a:t>
+                      </a:r>
+                    </a:p>
+                    <a:p>
+                      <a:pPr marL="285750" indent="-285750">
+                        <a:buFont typeface="Wingdings" panose="05000000000000000000" pitchFamily="2" charset="2"/>
+                        <a:buChar char="ü"/>
+                      </a:pPr>
+                      <a:r>
+                        <a:rPr lang="en-US" sz="1200" b="0" dirty="0">
+                          <a:solidFill>
+                            <a:schemeClr val="tx1">
+                              <a:lumMod val="50000"/>
+                              <a:lumOff val="50000"/>
+                            </a:schemeClr>
+                          </a:solidFill>
+                          <a:latin typeface="Gill Sans MT" panose="020B0502020104020203" pitchFamily="34" charset="0"/>
+                        </a:rPr>
+                        <a:t>Collate results of survey</a:t>
+                      </a:r>
+                    </a:p>
+                    <a:p>
+                      <a:pPr marL="285750" indent="-285750">
+                        <a:buFont typeface="Wingdings" panose="05000000000000000000" pitchFamily="2" charset="2"/>
+                        <a:buChar char="ü"/>
+                      </a:pPr>
+                      <a:r>
+                        <a:rPr lang="en-US" sz="1200" b="0" dirty="0">
+                          <a:solidFill>
+                            <a:schemeClr val="tx1">
+                              <a:lumMod val="50000"/>
+                              <a:lumOff val="50000"/>
+                            </a:schemeClr>
+                          </a:solidFill>
+                          <a:latin typeface="Gill Sans MT" panose="020B0502020104020203" pitchFamily="34" charset="0"/>
+                        </a:rPr>
+                        <a:t>Analyze survey results (Sprint 8)</a:t>
+                      </a:r>
+                    </a:p>
+                    <a:p>
+                      <a:endParaRPr lang="en-AU" sz="1200" dirty="0">
+                        <a:solidFill>
+                          <a:schemeClr val="tx1">
+                            <a:lumMod val="50000"/>
+                            <a:lumOff val="50000"/>
+                          </a:schemeClr>
+                        </a:solidFill>
+                        <a:latin typeface="Gill Sans MT" panose="020B0502020104020203" pitchFamily="34" charset="0"/>
+                      </a:endParaRPr>
+                    </a:p>
+                  </a:txBody>
+                  <a:tcPr>
+                    <a:solidFill>
+                      <a:schemeClr val="bg1"/>
+                    </a:solidFill>
+                  </a:tcPr>
+                </a:tc>
+                <a:tc>
+                  <a:txBody>
+                    <a:bodyPr/>
+                    <a:lstStyle/>
+                    <a:p>
+                      <a:r>
+                        <a:rPr lang="en-US" sz="1200" b="1" dirty="0">
+                          <a:solidFill>
+                            <a:schemeClr val="tx1">
+                              <a:lumMod val="50000"/>
+                              <a:lumOff val="50000"/>
+                            </a:schemeClr>
+                          </a:solidFill>
+                          <a:latin typeface="Gill Sans MT" panose="020B0502020104020203" pitchFamily="34" charset="0"/>
+                        </a:rPr>
+                        <a:t>Implement</a:t>
+                      </a:r>
+                    </a:p>
+                    <a:p>
+                      <a:pPr marL="285750" indent="-285750">
+                        <a:buFont typeface="Wingdings" panose="05000000000000000000" pitchFamily="2" charset="2"/>
+                        <a:buChar char="ü"/>
+                      </a:pPr>
+                      <a:r>
+                        <a:rPr lang="en-US" sz="1200" b="0" dirty="0">
+                          <a:solidFill>
+                            <a:schemeClr val="tx1">
+                              <a:lumMod val="50000"/>
+                              <a:lumOff val="50000"/>
+                            </a:schemeClr>
+                          </a:solidFill>
+                          <a:latin typeface="Gill Sans MT" panose="020B0502020104020203" pitchFamily="34" charset="0"/>
+                        </a:rPr>
+                        <a:t>Implement testing result changes</a:t>
+                      </a:r>
+                    </a:p>
+                    <a:p>
+                      <a:pPr marL="285750" indent="-285750">
+                        <a:buFont typeface="Wingdings" panose="05000000000000000000" pitchFamily="2" charset="2"/>
+                        <a:buChar char="ü"/>
+                      </a:pPr>
+                      <a:r>
+                        <a:rPr lang="en-US" sz="1200" b="0" dirty="0">
+                          <a:solidFill>
+                            <a:schemeClr val="tx1">
+                              <a:lumMod val="50000"/>
+                              <a:lumOff val="50000"/>
+                            </a:schemeClr>
+                          </a:solidFill>
+                          <a:latin typeface="Gill Sans MT" panose="020B0502020104020203" pitchFamily="34" charset="0"/>
+                        </a:rPr>
+                        <a:t>Implement any algorithmic optimization</a:t>
+                      </a:r>
+                    </a:p>
+                    <a:p>
+                      <a:pPr marL="285750" indent="-285750">
+                        <a:buFont typeface="Wingdings" panose="05000000000000000000" pitchFamily="2" charset="2"/>
+                        <a:buChar char="ü"/>
+                      </a:pPr>
+                      <a:r>
+                        <a:rPr lang="en-US" sz="1200" b="0" dirty="0">
+                          <a:solidFill>
+                            <a:schemeClr val="tx1">
+                              <a:lumMod val="50000"/>
+                              <a:lumOff val="50000"/>
+                            </a:schemeClr>
+                          </a:solidFill>
+                          <a:latin typeface="Gill Sans MT" panose="020B0502020104020203" pitchFamily="34" charset="0"/>
+                        </a:rPr>
+                        <a:t>Prepare Amazon Web Services or other cloud computing service for handover to client</a:t>
+                      </a:r>
+                    </a:p>
+                    <a:p>
+                      <a:pPr marL="285750" indent="-285750">
+                        <a:buFont typeface="Wingdings" panose="05000000000000000000" pitchFamily="2" charset="2"/>
+                        <a:buChar char="ü"/>
+                      </a:pPr>
+                      <a:r>
+                        <a:rPr lang="en-US" sz="1200" b="0" dirty="0">
+                          <a:solidFill>
+                            <a:schemeClr val="tx1">
+                              <a:lumMod val="50000"/>
+                              <a:lumOff val="50000"/>
+                            </a:schemeClr>
+                          </a:solidFill>
+                          <a:latin typeface="Gill Sans MT" panose="020B0502020104020203" pitchFamily="34" charset="0"/>
+                        </a:rPr>
+                        <a:t>Prepare any required documentation (Sprint 9 &amp; 10)</a:t>
+                      </a:r>
+                    </a:p>
+                    <a:p>
+                      <a:endParaRPr lang="en-AU" sz="1200" dirty="0">
+                        <a:solidFill>
+                          <a:schemeClr val="tx1">
+                            <a:lumMod val="50000"/>
+                            <a:lumOff val="50000"/>
+                          </a:schemeClr>
+                        </a:solidFill>
+                        <a:latin typeface="Gill Sans MT" panose="020B0502020104020203" pitchFamily="34" charset="0"/>
+                      </a:endParaRPr>
+                    </a:p>
+                  </a:txBody>
+                  <a:tcPr>
+                    <a:solidFill>
+                      <a:schemeClr val="bg1"/>
+                    </a:solidFill>
+                  </a:tcPr>
+                </a:tc>
+                <a:extLst>
+                  <a:ext uri="{0D108BD9-81ED-4DB2-BD59-A6C34878D82A}">
+                    <a16:rowId xmlns:a16="http://schemas.microsoft.com/office/drawing/2014/main" val="565401540"/>
+                  </a:ext>
+                </a:extLst>
+              </a:tr>
+            </a:tbl>
+          </a:graphicData>
+        </a:graphic>
+      </p:graphicFrame>
     </p:spTree>
     <p:extLst>
       <p:ext uri="{BB962C8B-B14F-4D97-AF65-F5344CB8AC3E}">
@@ -3335,4 +4489,265 @@
     </a:ext>
   </a:extLst>
 </a:theme>
+</file>
+
+<file path=ppt/theme/theme2.xml><?xml version="1.0" encoding="utf-8"?>
+<a:theme xmlns:a="http://schemas.openxmlformats.org/drawingml/2006/main" name="Office Theme">
+  <a:themeElements>
+    <a:clrScheme name="Office">
+      <a:dk1>
+        <a:sysClr val="windowText" lastClr="000000"/>
+      </a:dk1>
+      <a:lt1>
+        <a:sysClr val="window" lastClr="FFFFFF"/>
+      </a:lt1>
+      <a:dk2>
+        <a:srgbClr val="44546A"/>
+      </a:dk2>
+      <a:lt2>
+        <a:srgbClr val="E7E6E6"/>
+      </a:lt2>
+      <a:accent1>
+        <a:srgbClr val="5B9BD5"/>
+      </a:accent1>
+      <a:accent2>
+        <a:srgbClr val="ED7D31"/>
+      </a:accent2>
+      <a:accent3>
+        <a:srgbClr val="A5A5A5"/>
+      </a:accent3>
+      <a:accent4>
+        <a:srgbClr val="FFC000"/>
+      </a:accent4>
+      <a:accent5>
+        <a:srgbClr val="4472C4"/>
+      </a:accent5>
+      <a:accent6>
+        <a:srgbClr val="70AD47"/>
+      </a:accent6>
+      <a:hlink>
+        <a:srgbClr val="0563C1"/>
+      </a:hlink>
+      <a:folHlink>
+        <a:srgbClr val="954F72"/>
+      </a:folHlink>
+    </a:clrScheme>
+    <a:fontScheme name="Office">
+      <a:majorFont>
+        <a:latin typeface="Calibri Light" panose="020F0302020204030204"/>
+        <a:ea typeface=""/>
+        <a:cs typeface=""/>
+        <a:font script="Jpan" typeface="Yu Gothic Light"/>
+        <a:font script="Hang" typeface="맑은 고딕"/>
+        <a:font script="Hans" typeface="DengXian Light"/>
+        <a:font script="Hant" typeface="新細明體"/>
+        <a:font script="Arab" typeface="Times New Roman"/>
+        <a:font script="Hebr" typeface="Times New Roman"/>
+        <a:font script="Thai" typeface="Angsana New"/>
+        <a:font script="Ethi" typeface="Nyala"/>
+        <a:font script="Beng" typeface="Vrinda"/>
+        <a:font script="Gujr" typeface="Shruti"/>
+        <a:font script="Khmr" typeface="MoolBoran"/>
+        <a:font script="Knda" typeface="Tunga"/>
+        <a:font script="Guru" typeface="Raavi"/>
+        <a:font script="Cans" typeface="Euphemia"/>
+        <a:font script="Cher" typeface="Plantagenet Cherokee"/>
+        <a:font script="Yiii" typeface="Microsoft Yi Baiti"/>
+        <a:font script="Tibt" typeface="Microsoft Himalaya"/>
+        <a:font script="Thaa" typeface="MV Boli"/>
+        <a:font script="Deva" typeface="Mangal"/>
+        <a:font script="Telu" typeface="Gautami"/>
+        <a:font script="Taml" typeface="Latha"/>
+        <a:font script="Syrc" typeface="Estrangelo Edessa"/>
+        <a:font script="Orya" typeface="Kalinga"/>
+        <a:font script="Mlym" typeface="Kartika"/>
+        <a:font script="Laoo" typeface="DokChampa"/>
+        <a:font script="Sinh" typeface="Iskoola Pota"/>
+        <a:font script="Mong" typeface="Mongolian Baiti"/>
+        <a:font script="Viet" typeface="Times New Roman"/>
+        <a:font script="Uigh" typeface="Microsoft Uighur"/>
+        <a:font script="Geor" typeface="Sylfaen"/>
+      </a:majorFont>
+      <a:minorFont>
+        <a:latin typeface="Calibri" panose="020F0502020204030204"/>
+        <a:ea typeface=""/>
+        <a:cs typeface=""/>
+        <a:font script="Jpan" typeface="Yu Gothic"/>
+        <a:font script="Hang" typeface="맑은 고딕"/>
+        <a:font script="Hans" typeface="DengXian"/>
+        <a:font script="Hant" typeface="新細明體"/>
+        <a:font script="Arab" typeface="Arial"/>
+        <a:font script="Hebr" typeface="Arial"/>
+        <a:font script="Thai" typeface="Cordia New"/>
+        <a:font script="Ethi" typeface="Nyala"/>
+        <a:font script="Beng" typeface="Vrinda"/>
+        <a:font script="Gujr" typeface="Shruti"/>
+        <a:font script="Khmr" typeface="DaunPenh"/>
+        <a:font script="Knda" typeface="Tunga"/>
+        <a:font script="Guru" typeface="Raavi"/>
+        <a:font script="Cans" typeface="Euphemia"/>
+        <a:font script="Cher" typeface="Plantagenet Cherokee"/>
+        <a:font script="Yiii" typeface="Microsoft Yi Baiti"/>
+        <a:font script="Tibt" typeface="Microsoft Himalaya"/>
+        <a:font script="Thaa" typeface="MV Boli"/>
+        <a:font script="Deva" typeface="Mangal"/>
+        <a:font script="Telu" typeface="Gautami"/>
+        <a:font script="Taml" typeface="Latha"/>
+        <a:font script="Syrc" typeface="Estrangelo Edessa"/>
+        <a:font script="Orya" typeface="Kalinga"/>
+        <a:font script="Mlym" typeface="Kartika"/>
+        <a:font script="Laoo" typeface="DokChampa"/>
+        <a:font script="Sinh" typeface="Iskoola Pota"/>
+        <a:font script="Mong" typeface="Mongolian Baiti"/>
+        <a:font script="Viet" typeface="Arial"/>
+        <a:font script="Uigh" typeface="Microsoft Uighur"/>
+        <a:font script="Geor" typeface="Sylfaen"/>
+      </a:minorFont>
+    </a:fontScheme>
+    <a:fmtScheme name="Office">
+      <a:fillStyleLst>
+        <a:solidFill>
+          <a:schemeClr val="phClr"/>
+        </a:solidFill>
+        <a:gradFill rotWithShape="1">
+          <a:gsLst>
+            <a:gs pos="0">
+              <a:schemeClr val="phClr">
+                <a:lumMod val="110000"/>
+                <a:satMod val="105000"/>
+                <a:tint val="67000"/>
+              </a:schemeClr>
+            </a:gs>
+            <a:gs pos="50000">
+              <a:schemeClr val="phClr">
+                <a:lumMod val="105000"/>
+                <a:satMod val="103000"/>
+                <a:tint val="73000"/>
+              </a:schemeClr>
+            </a:gs>
+            <a:gs pos="100000">
+              <a:schemeClr val="phClr">
+                <a:lumMod val="105000"/>
+                <a:satMod val="109000"/>
+                <a:tint val="81000"/>
+              </a:schemeClr>
+            </a:gs>
+          </a:gsLst>
+          <a:lin ang="5400000" scaled="0"/>
+        </a:gradFill>
+        <a:gradFill rotWithShape="1">
+          <a:gsLst>
+            <a:gs pos="0">
+              <a:schemeClr val="phClr">
+                <a:satMod val="103000"/>
+                <a:lumMod val="102000"/>
+                <a:tint val="94000"/>
+              </a:schemeClr>
+            </a:gs>
+            <a:gs pos="50000">
+              <a:schemeClr val="phClr">
+                <a:satMod val="110000"/>
+                <a:lumMod val="100000"/>
+                <a:shade val="100000"/>
+              </a:schemeClr>
+            </a:gs>
+            <a:gs pos="100000">
+              <a:schemeClr val="phClr">
+                <a:lumMod val="99000"/>
+                <a:satMod val="120000"/>
+                <a:shade val="78000"/>
+              </a:schemeClr>
+            </a:gs>
+          </a:gsLst>
+          <a:lin ang="5400000" scaled="0"/>
+        </a:gradFill>
+      </a:fillStyleLst>
+      <a:lnStyleLst>
+        <a:ln w="6350" cap="flat" cmpd="sng" algn="ctr">
+          <a:solidFill>
+            <a:schemeClr val="phClr"/>
+          </a:solidFill>
+          <a:prstDash val="solid"/>
+          <a:miter lim="800000"/>
+        </a:ln>
+        <a:ln w="12700" cap="flat" cmpd="sng" algn="ctr">
+          <a:solidFill>
+            <a:schemeClr val="phClr"/>
+          </a:solidFill>
+          <a:prstDash val="solid"/>
+          <a:miter lim="800000"/>
+        </a:ln>
+        <a:ln w="19050" cap="flat" cmpd="sng" algn="ctr">
+          <a:solidFill>
+            <a:schemeClr val="phClr"/>
+          </a:solidFill>
+          <a:prstDash val="solid"/>
+          <a:miter lim="800000"/>
+        </a:ln>
+      </a:lnStyleLst>
+      <a:effectStyleLst>
+        <a:effectStyle>
+          <a:effectLst/>
+        </a:effectStyle>
+        <a:effectStyle>
+          <a:effectLst/>
+        </a:effectStyle>
+        <a:effectStyle>
+          <a:effectLst>
+            <a:outerShdw blurRad="57150" dist="19050" dir="5400000" algn="ctr" rotWithShape="0">
+              <a:srgbClr val="000000">
+                <a:alpha val="63000"/>
+              </a:srgbClr>
+            </a:outerShdw>
+          </a:effectLst>
+        </a:effectStyle>
+      </a:effectStyleLst>
+      <a:bgFillStyleLst>
+        <a:solidFill>
+          <a:schemeClr val="phClr"/>
+        </a:solidFill>
+        <a:solidFill>
+          <a:schemeClr val="phClr">
+            <a:tint val="95000"/>
+            <a:satMod val="170000"/>
+          </a:schemeClr>
+        </a:solidFill>
+        <a:gradFill rotWithShape="1">
+          <a:gsLst>
+            <a:gs pos="0">
+              <a:schemeClr val="phClr">
+                <a:tint val="93000"/>
+                <a:satMod val="150000"/>
+                <a:shade val="98000"/>
+                <a:lumMod val="102000"/>
+              </a:schemeClr>
+            </a:gs>
+            <a:gs pos="50000">
+              <a:schemeClr val="phClr">
+                <a:tint val="98000"/>
+                <a:satMod val="130000"/>
+                <a:shade val="90000"/>
+                <a:lumMod val="103000"/>
+              </a:schemeClr>
+            </a:gs>
+            <a:gs pos="100000">
+              <a:schemeClr val="phClr">
+                <a:shade val="63000"/>
+                <a:satMod val="120000"/>
+              </a:schemeClr>
+            </a:gs>
+          </a:gsLst>
+          <a:lin ang="5400000" scaled="0"/>
+        </a:gradFill>
+      </a:bgFillStyleLst>
+    </a:fmtScheme>
+  </a:themeElements>
+  <a:objectDefaults/>
+  <a:extraClrSchemeLst/>
+  <a:extLst>
+    <a:ext uri="{05A4C25C-085E-4340-85A3-A5531E510DB2}">
+      <thm15:themeFamily xmlns:thm15="http://schemas.microsoft.com/office/thememl/2012/main" name="Office Theme" id="{62F939B6-93AF-4DB8-9C6B-D6C7DFDC589F}" vid="{4A3C46E8-61CC-4603-A589-7422A47A8E4A}"/>
+    </a:ext>
+  </a:extLst>
+</a:theme>
 </file>
</xml_diff>